<commit_message>
balance the bandwidth among the opened nodes in docker manager
</commit_message>
<xml_diff>
--- a/first_iteration.pptx
+++ b/first_iteration.pptx
@@ -230,7 +230,7 @@
           <a:p>
             <a:fld id="{03573BAD-26BF-45FC-A316-E1836D95B7B8}" type="datetimeFigureOut">
               <a:rPr lang="en-US" smtClean="0"/>
-              <a:t>12/13/2024</a:t>
+              <a:t>12/16/2024</a:t>
             </a:fld>
             <a:endParaRPr lang="en-US"/>
           </a:p>
@@ -562,7 +562,7 @@
           <a:p>
             <a:fld id="{F088DBFF-C64D-4374-B24D-3FD9CC14944E}" type="slidenum">
               <a:rPr lang="en-US" smtClean="0"/>
-              <a:t>2</a:t>
+              <a:t>1</a:t>
             </a:fld>
             <a:endParaRPr lang="en-US"/>
           </a:p>
@@ -571,7 +571,7 @@
     </p:spTree>
     <p:extLst>
       <p:ext uri="{BB962C8B-B14F-4D97-AF65-F5344CB8AC3E}">
-        <p14:creationId xmlns:p14="http://schemas.microsoft.com/office/powerpoint/2010/main" val="3116482300"/>
+        <p14:creationId xmlns:p14="http://schemas.microsoft.com/office/powerpoint/2010/main" val="4055300271"/>
       </p:ext>
     </p:extLst>
   </p:cSld>
@@ -625,6 +625,90 @@
           <a:bodyPr/>
           <a:lstStyle/>
           <a:p>
+            <a:endParaRPr lang="he-IL" dirty="0"/>
+          </a:p>
+        </p:txBody>
+      </p:sp>
+      <p:sp>
+        <p:nvSpPr>
+          <p:cNvPr id="4" name="Slide Number Placeholder 3"/>
+          <p:cNvSpPr>
+            <a:spLocks noGrp="1"/>
+          </p:cNvSpPr>
+          <p:nvPr>
+            <p:ph type="sldNum" sz="quarter" idx="5"/>
+          </p:nvPr>
+        </p:nvSpPr>
+        <p:spPr/>
+        <p:txBody>
+          <a:bodyPr/>
+          <a:lstStyle/>
+          <a:p>
+            <a:fld id="{F088DBFF-C64D-4374-B24D-3FD9CC14944E}" type="slidenum">
+              <a:rPr lang="en-US" smtClean="0"/>
+              <a:t>2</a:t>
+            </a:fld>
+            <a:endParaRPr lang="en-US"/>
+          </a:p>
+        </p:txBody>
+      </p:sp>
+    </p:spTree>
+    <p:extLst>
+      <p:ext uri="{BB962C8B-B14F-4D97-AF65-F5344CB8AC3E}">
+        <p14:creationId xmlns:p14="http://schemas.microsoft.com/office/powerpoint/2010/main" val="3116482300"/>
+      </p:ext>
+    </p:extLst>
+  </p:cSld>
+  <p:clrMapOvr>
+    <a:masterClrMapping/>
+  </p:clrMapOvr>
+</p:notes>
+</file>
+
+<file path=ppt/notesSlides/notesSlide3.xml><?xml version="1.0" encoding="utf-8"?>
+<p:notes xmlns:a="http://schemas.openxmlformats.org/drawingml/2006/main" xmlns:r="http://schemas.openxmlformats.org/officeDocument/2006/relationships" xmlns:p="http://schemas.openxmlformats.org/presentationml/2006/main">
+  <p:cSld>
+    <p:spTree>
+      <p:nvGrpSpPr>
+        <p:cNvPr id="1" name=""/>
+        <p:cNvGrpSpPr/>
+        <p:nvPr/>
+      </p:nvGrpSpPr>
+      <p:grpSpPr>
+        <a:xfrm>
+          <a:off x="0" y="0"/>
+          <a:ext cx="0" cy="0"/>
+          <a:chOff x="0" y="0"/>
+          <a:chExt cx="0" cy="0"/>
+        </a:xfrm>
+      </p:grpSpPr>
+      <p:sp>
+        <p:nvSpPr>
+          <p:cNvPr id="2" name="Slide Image Placeholder 1"/>
+          <p:cNvSpPr>
+            <a:spLocks noGrp="1" noRot="1" noChangeAspect="1"/>
+          </p:cNvSpPr>
+          <p:nvPr>
+            <p:ph type="sldImg"/>
+          </p:nvPr>
+        </p:nvSpPr>
+        <p:spPr/>
+      </p:sp>
+      <p:sp>
+        <p:nvSpPr>
+          <p:cNvPr id="3" name="Notes Placeholder 2"/>
+          <p:cNvSpPr>
+            <a:spLocks noGrp="1"/>
+          </p:cNvSpPr>
+          <p:nvPr>
+            <p:ph type="body" idx="1"/>
+          </p:nvPr>
+        </p:nvSpPr>
+        <p:spPr/>
+        <p:txBody>
+          <a:bodyPr/>
+          <a:lstStyle/>
+          <a:p>
             <a:r>
               <a:rPr lang="he-IL" dirty="0"/>
               <a:t>חלוק</a:t>
@@ -673,7 +757,7 @@
 </p:notes>
 </file>
 
-<file path=ppt/notesSlides/notesSlide3.xml><?xml version="1.0" encoding="utf-8"?>
+<file path=ppt/notesSlides/notesSlide4.xml><?xml version="1.0" encoding="utf-8"?>
 <p:notes xmlns:a="http://schemas.openxmlformats.org/drawingml/2006/main" xmlns:r="http://schemas.openxmlformats.org/officeDocument/2006/relationships" xmlns:p="http://schemas.openxmlformats.org/presentationml/2006/main">
   <p:cSld>
     <p:spTree>
@@ -902,7 +986,7 @@
           <a:p>
             <a:fld id="{ACE0332F-FCE7-43B8-8B44-ECBD436CDFD7}" type="datetimeFigureOut">
               <a:rPr lang="he-IL" smtClean="0"/>
-              <a:t>י"ב/כסלו/תשפ"ה</a:t>
+              <a:t>ט"ו/כסלו/תשפ"ה</a:t>
             </a:fld>
             <a:endParaRPr lang="he-IL"/>
           </a:p>
@@ -1086,7 +1170,7 @@
           <a:p>
             <a:fld id="{ACE0332F-FCE7-43B8-8B44-ECBD436CDFD7}" type="datetimeFigureOut">
               <a:rPr lang="he-IL" smtClean="0"/>
-              <a:t>י"ב/כסלו/תשפ"ה</a:t>
+              <a:t>ט"ו/כסלו/תשפ"ה</a:t>
             </a:fld>
             <a:endParaRPr lang="he-IL"/>
           </a:p>
@@ -1280,7 +1364,7 @@
           <a:p>
             <a:fld id="{ACE0332F-FCE7-43B8-8B44-ECBD436CDFD7}" type="datetimeFigureOut">
               <a:rPr lang="he-IL" smtClean="0"/>
-              <a:t>י"ב/כסלו/תשפ"ה</a:t>
+              <a:t>ט"ו/כסלו/תשפ"ה</a:t>
             </a:fld>
             <a:endParaRPr lang="he-IL"/>
           </a:p>
@@ -1464,7 +1548,7 @@
           <a:p>
             <a:fld id="{ACE0332F-FCE7-43B8-8B44-ECBD436CDFD7}" type="datetimeFigureOut">
               <a:rPr lang="he-IL" smtClean="0"/>
-              <a:t>י"ב/כסלו/תשפ"ה</a:t>
+              <a:t>ט"ו/כסלו/תשפ"ה</a:t>
             </a:fld>
             <a:endParaRPr lang="he-IL"/>
           </a:p>
@@ -1725,7 +1809,7 @@
           <a:p>
             <a:fld id="{ACE0332F-FCE7-43B8-8B44-ECBD436CDFD7}" type="datetimeFigureOut">
               <a:rPr lang="he-IL" smtClean="0"/>
-              <a:t>י"ב/כסלו/תשפ"ה</a:t>
+              <a:t>ט"ו/כסלו/תשפ"ה</a:t>
             </a:fld>
             <a:endParaRPr lang="he-IL"/>
           </a:p>
@@ -1970,7 +2054,7 @@
           <a:p>
             <a:fld id="{ACE0332F-FCE7-43B8-8B44-ECBD436CDFD7}" type="datetimeFigureOut">
               <a:rPr lang="he-IL" smtClean="0"/>
-              <a:t>י"ב/כסלו/תשפ"ה</a:t>
+              <a:t>ט"ו/כסלו/תשפ"ה</a:t>
             </a:fld>
             <a:endParaRPr lang="he-IL"/>
           </a:p>
@@ -2350,7 +2434,7 @@
           <a:p>
             <a:fld id="{ACE0332F-FCE7-43B8-8B44-ECBD436CDFD7}" type="datetimeFigureOut">
               <a:rPr lang="he-IL" smtClean="0"/>
-              <a:t>י"ב/כסלו/תשפ"ה</a:t>
+              <a:t>ט"ו/כסלו/תשפ"ה</a:t>
             </a:fld>
             <a:endParaRPr lang="he-IL"/>
           </a:p>
@@ -2483,7 +2567,7 @@
           <a:p>
             <a:fld id="{ACE0332F-FCE7-43B8-8B44-ECBD436CDFD7}" type="datetimeFigureOut">
               <a:rPr lang="he-IL" smtClean="0"/>
-              <a:t>י"ב/כסלו/תשפ"ה</a:t>
+              <a:t>ט"ו/כסלו/תשפ"ה</a:t>
             </a:fld>
             <a:endParaRPr lang="he-IL"/>
           </a:p>
@@ -2594,7 +2678,7 @@
           <a:p>
             <a:fld id="{ACE0332F-FCE7-43B8-8B44-ECBD436CDFD7}" type="datetimeFigureOut">
               <a:rPr lang="he-IL" smtClean="0"/>
-              <a:t>י"ב/כסלו/תשפ"ה</a:t>
+              <a:t>ט"ו/כסלו/תשפ"ה</a:t>
             </a:fld>
             <a:endParaRPr lang="he-IL"/>
           </a:p>
@@ -2885,7 +2969,7 @@
           <a:p>
             <a:fld id="{ACE0332F-FCE7-43B8-8B44-ECBD436CDFD7}" type="datetimeFigureOut">
               <a:rPr lang="he-IL" smtClean="0"/>
-              <a:t>י"ב/כסלו/תשפ"ה</a:t>
+              <a:t>ט"ו/כסלו/תשפ"ה</a:t>
             </a:fld>
             <a:endParaRPr lang="he-IL"/>
           </a:p>
@@ -3153,7 +3237,7 @@
           <a:p>
             <a:fld id="{ACE0332F-FCE7-43B8-8B44-ECBD436CDFD7}" type="datetimeFigureOut">
               <a:rPr lang="he-IL" smtClean="0"/>
-              <a:t>י"ב/כסלו/תשפ"ה</a:t>
+              <a:t>ט"ו/כסלו/תשפ"ה</a:t>
             </a:fld>
             <a:endParaRPr lang="he-IL"/>
           </a:p>
@@ -5638,22 +5722,19 @@
             <p:ph type="ctrTitle"/>
           </p:nvPr>
         </p:nvSpPr>
-        <p:spPr/>
+        <p:spPr>
+          <a:xfrm>
+            <a:off x="1524000" y="589927"/>
+            <a:ext cx="9144000" cy="2387600"/>
+          </a:xfrm>
+        </p:spPr>
         <p:txBody>
           <a:bodyPr/>
           <a:lstStyle/>
           <a:p>
             <a:r>
               <a:rPr lang="he-IL" dirty="0"/>
-              <a:t>הצגת ספרינט </a:t>
-            </a:r>
-            <a:r>
-              <a:rPr lang="en-US" dirty="0"/>
-              <a:t>I</a:t>
-            </a:r>
-            <a:r>
-              <a:rPr lang="he-IL" dirty="0"/>
-              <a:t> – פרויקט </a:t>
+              <a:t>הצגת ספרינט 1 – פרויקט </a:t>
             </a:r>
             <a:r>
               <a:rPr lang="en-US" dirty="0"/>
@@ -5663,9 +5744,62 @@
           </a:p>
         </p:txBody>
       </p:sp>
-      <p:sp>
-        <p:nvSpPr>
-          <p:cNvPr id="3" name="כותרת משנה 2"/>
+      <p:pic>
+        <p:nvPicPr>
+          <p:cNvPr id="1026" name="Picture 2">
+            <a:extLst>
+              <a:ext uri="{FF2B5EF4-FFF2-40B4-BE49-F238E27FC236}">
+                <a16:creationId xmlns:a16="http://schemas.microsoft.com/office/drawing/2014/main" id="{4D9ADC87-3ADE-5C1F-8CEA-E68E51D55B87}"/>
+              </a:ext>
+            </a:extLst>
+          </p:cNvPr>
+          <p:cNvPicPr>
+            <a:picLocks noChangeAspect="1" noChangeArrowheads="1"/>
+          </p:cNvPicPr>
+          <p:nvPr/>
+        </p:nvPicPr>
+        <p:blipFill>
+          <a:blip r:embed="rId3">
+            <a:extLst>
+              <a:ext uri="{28A0092B-C50C-407E-A947-70E740481C1C}">
+                <a14:useLocalDpi xmlns:a14="http://schemas.microsoft.com/office/drawing/2010/main" val="0"/>
+              </a:ext>
+            </a:extLst>
+          </a:blip>
+          <a:srcRect/>
+          <a:stretch>
+            <a:fillRect/>
+          </a:stretch>
+        </p:blipFill>
+        <p:spPr bwMode="auto">
+          <a:xfrm>
+            <a:off x="2611597" y="2981948"/>
+            <a:ext cx="6181725" cy="3286125"/>
+          </a:xfrm>
+          <a:prstGeom prst="rect">
+            <a:avLst/>
+          </a:prstGeom>
+          <a:noFill/>
+          <a:extLst>
+            <a:ext uri="{909E8E84-426E-40DD-AFC4-6F175D3DCCD1}">
+              <a14:hiddenFill xmlns:a14="http://schemas.microsoft.com/office/drawing/2010/main">
+                <a:solidFill>
+                  <a:srgbClr val="FFFFFF"/>
+                </a:solidFill>
+              </a14:hiddenFill>
+            </a:ext>
+          </a:extLst>
+        </p:spPr>
+      </p:pic>
+      <p:sp>
+        <p:nvSpPr>
+          <p:cNvPr id="5" name="Subtitle 4">
+            <a:extLst>
+              <a:ext uri="{FF2B5EF4-FFF2-40B4-BE49-F238E27FC236}">
+                <a16:creationId xmlns:a16="http://schemas.microsoft.com/office/drawing/2014/main" id="{4233E16F-6F1D-5B97-3A54-291DE94BD629}"/>
+              </a:ext>
+            </a:extLst>
+          </p:cNvPr>
           <p:cNvSpPr>
             <a:spLocks noGrp="1"/>
           </p:cNvSpPr>
@@ -5673,23 +5807,19 @@
             <p:ph type="subTitle" idx="1"/>
           </p:nvPr>
         </p:nvSpPr>
-        <p:spPr/>
-        <p:txBody>
-          <a:bodyPr/>
-          <a:lstStyle/>
-          <a:p>
-            <a:r>
-              <a:rPr lang="he-IL" dirty="0"/>
-              <a:t>מציגים:ליאם</a:t>
-            </a:r>
-            <a:r>
-              <a:rPr lang="en-US" dirty="0"/>
-              <a:t>,</a:t>
-            </a:r>
-            <a:r>
-              <a:rPr lang="he-IL" dirty="0"/>
-              <a:t> גבריאל</a:t>
-            </a:r>
+        <p:spPr>
+          <a:xfrm>
+            <a:off x="-1126023" y="3649498"/>
+            <a:ext cx="45719" cy="45719"/>
+          </a:xfrm>
+        </p:spPr>
+        <p:txBody>
+          <a:bodyPr>
+            <a:normAutofit fontScale="25000" lnSpcReduction="20000"/>
+          </a:bodyPr>
+          <a:lstStyle/>
+          <a:p>
+            <a:endParaRPr lang="he-IL" dirty="0"/>
           </a:p>
         </p:txBody>
       </p:sp>
@@ -5786,7 +5916,15 @@
             </a:r>
             <a:r>
               <a:rPr lang="he-IL" dirty="0"/>
-              <a:t> ומחזירה לו את התשובה של האתר ההודעות נשלחות ברשת בשיט</a:t>
+              <a:t> ומחזירה לו את התשובה של האתר ההודעות נשלחות ברשת בשיטה של רשת </a:t>
+            </a:r>
+            <a:r>
+              <a:rPr lang="en-US" dirty="0"/>
+              <a:t>tor </a:t>
+            </a:r>
+            <a:r>
+              <a:rPr lang="he-IL" dirty="0"/>
+              <a:t> רישמית </a:t>
             </a:r>
           </a:p>
           <a:p>
@@ -5834,8 +5972,8 @@
         </p:blipFill>
         <p:spPr>
           <a:xfrm>
-            <a:off x="2071869" y="2375190"/>
-            <a:ext cx="9387067" cy="3863563"/>
+            <a:off x="1989882" y="2815522"/>
+            <a:ext cx="9363918" cy="3854035"/>
           </a:xfrm>
           <a:prstGeom prst="rect">
             <a:avLst/>
@@ -5930,31 +6068,7 @@
             </a:r>
             <a:r>
               <a:rPr lang="en-US" sz="2800" dirty="0"/>
-              <a:t> boost </a:t>
-            </a:r>
-            <a:r>
-              <a:rPr lang="en-US" sz="2800" dirty="0" err="1"/>
-              <a:t>multy</a:t>
-            </a:r>
-            <a:r>
-              <a:rPr lang="en-US" sz="2800" dirty="0"/>
-              <a:t> </a:t>
-            </a:r>
-            <a:r>
-              <a:rPr lang="en-US" sz="2800" dirty="0" err="1"/>
-              <a:t>precition</a:t>
-            </a:r>
-            <a:r>
-              <a:rPr lang="en-US" sz="2800" dirty="0"/>
-              <a:t>, </a:t>
-            </a:r>
-            <a:r>
-              <a:rPr lang="en-US" sz="2800" dirty="0" err="1"/>
-              <a:t>cmake</a:t>
-            </a:r>
-            <a:r>
-              <a:rPr lang="en-US" sz="2800" dirty="0"/>
-              <a:t>, make… </a:t>
+              <a:t> boost multy precition, cmake, make… </a:t>
             </a:r>
             <a:endParaRPr lang="he-IL" sz="2800" dirty="0"/>
           </a:p>
@@ -6015,7 +6129,7 @@
               <a:t>לממש קוד בסיס של </a:t>
             </a:r>
             <a:r>
-              <a:rPr lang="en-US" dirty="0" err="1"/>
+              <a:rPr lang="en-US" dirty="0"/>
               <a:t>node,server,client</a:t>
             </a:r>
             <a:r>
@@ -6574,7 +6688,13 @@
           <a:p>
             <a:r>
               <a:rPr lang="he-IL" dirty="0"/>
-              <a:t>מה דעתכם?</a:t>
+              <a:t>מה דעתכם:</a:t>
+            </a:r>
+          </a:p>
+          <a:p>
+            <a:r>
+              <a:rPr lang="he-IL" dirty="0"/>
+              <a:t>לפי דעתינו עבדנו מעולה ואפילו שהיו קצת פערים הספקנו לקחת הרבה משימות הספרינט הזה ובעצם ליצור תשתית חזקה </a:t>
             </a:r>
           </a:p>
         </p:txBody>
@@ -6646,7 +6766,7 @@
           <a:bodyPr/>
           <a:lstStyle/>
           <a:p>
-            <a:endParaRPr lang="en-US"/>
+            <a:endParaRPr lang="en-US" dirty="0"/>
           </a:p>
         </p:txBody>
       </p:sp>

</xml_diff>